<commit_message>
minor change to two slides
</commit_message>
<xml_diff>
--- a/03_Initial_Presentation_v2.pptx
+++ b/03_Initial_Presentation_v2.pptx
@@ -6940,7 +6940,16 @@
                 <a:cs typeface="Avenir"/>
                 <a:sym typeface="Avenir"/>
               </a:rPr>
-              <a:t>A website that will allow for a more dynamic quiz dialog between teachers and their students.</a:t>
+              <a:t>A website that will allow for a more dynamic quiz dialog between teachers and their students</a:t>
+            </a:r>
+            <a:r>
+              <a:rPr lang="en" sz="2400">
+                <a:latin typeface="Avenir"/>
+                <a:ea typeface="Avenir"/>
+                <a:cs typeface="Avenir"/>
+                <a:sym typeface="Avenir"/>
+              </a:rPr>
+              <a:t>.</a:t>
             </a:r>
             <a:endParaRPr sz="2400">
               <a:latin typeface="Avenir"/>
@@ -6977,7 +6986,16 @@
                 <a:cs typeface="Avenir"/>
                 <a:sym typeface="Avenir"/>
               </a:rPr>
-              <a:t>High level goals: Quiz creation, class management by teacher-users, quiz grading and feedback. </a:t>
+              <a:t>High level goals: Quiz creation, class management by teacher-users, quiz grading</a:t>
+            </a:r>
+            <a:r>
+              <a:rPr lang="en" sz="2400">
+                <a:latin typeface="Avenir"/>
+                <a:ea typeface="Avenir"/>
+                <a:cs typeface="Avenir"/>
+                <a:sym typeface="Avenir"/>
+              </a:rPr>
+              <a:t>, question database pool with dynamic feedback based on results.</a:t>
             </a:r>
             <a:endParaRPr sz="2400">
               <a:latin typeface="Avenir"/>

</xml_diff>